<commit_message>
Agregué una diapositiva mas
Otra diapositiva
</commit_message>
<xml_diff>
--- a/presentaciones/Presentación1.pptx
+++ b/presentaciones/Presentación1.pptx
@@ -7,6 +7,7 @@
   <p:sldIdLst>
     <p:sldId id="256" r:id="rId2"/>
     <p:sldId id="257" r:id="rId3"/>
+    <p:sldId id="258" r:id="rId4"/>
   </p:sldIdLst>
   <p:sldSz cx="9144000" cy="6858000" type="screen4x3"/>
   <p:notesSz cx="6858000" cy="9144000"/>
@@ -289,7 +290,7 @@
           <a:p>
             <a:fld id="{C403A486-0FA8-1249-B859-E247FA41F85C}" type="datetimeFigureOut">
               <a:rPr lang="es-ES" smtClean="0"/>
-              <a:t>8/23/13</a:t>
+              <a:t>10/17/14</a:t>
             </a:fld>
             <a:endParaRPr lang="es-ES"/>
           </a:p>
@@ -459,7 +460,7 @@
           <a:p>
             <a:fld id="{C403A486-0FA8-1249-B859-E247FA41F85C}" type="datetimeFigureOut">
               <a:rPr lang="es-ES" smtClean="0"/>
-              <a:t>8/23/13</a:t>
+              <a:t>10/17/14</a:t>
             </a:fld>
             <a:endParaRPr lang="es-ES"/>
           </a:p>
@@ -639,7 +640,7 @@
           <a:p>
             <a:fld id="{C403A486-0FA8-1249-B859-E247FA41F85C}" type="datetimeFigureOut">
               <a:rPr lang="es-ES" smtClean="0"/>
-              <a:t>8/23/13</a:t>
+              <a:t>10/17/14</a:t>
             </a:fld>
             <a:endParaRPr lang="es-ES"/>
           </a:p>
@@ -809,7 +810,7 @@
           <a:p>
             <a:fld id="{C403A486-0FA8-1249-B859-E247FA41F85C}" type="datetimeFigureOut">
               <a:rPr lang="es-ES" smtClean="0"/>
-              <a:t>8/23/13</a:t>
+              <a:t>10/17/14</a:t>
             </a:fld>
             <a:endParaRPr lang="es-ES"/>
           </a:p>
@@ -1055,7 +1056,7 @@
           <a:p>
             <a:fld id="{C403A486-0FA8-1249-B859-E247FA41F85C}" type="datetimeFigureOut">
               <a:rPr lang="es-ES" smtClean="0"/>
-              <a:t>8/23/13</a:t>
+              <a:t>10/17/14</a:t>
             </a:fld>
             <a:endParaRPr lang="es-ES"/>
           </a:p>
@@ -1343,7 +1344,7 @@
           <a:p>
             <a:fld id="{C403A486-0FA8-1249-B859-E247FA41F85C}" type="datetimeFigureOut">
               <a:rPr lang="es-ES" smtClean="0"/>
-              <a:t>8/23/13</a:t>
+              <a:t>10/17/14</a:t>
             </a:fld>
             <a:endParaRPr lang="es-ES"/>
           </a:p>
@@ -1765,7 +1766,7 @@
           <a:p>
             <a:fld id="{C403A486-0FA8-1249-B859-E247FA41F85C}" type="datetimeFigureOut">
               <a:rPr lang="es-ES" smtClean="0"/>
-              <a:t>8/23/13</a:t>
+              <a:t>10/17/14</a:t>
             </a:fld>
             <a:endParaRPr lang="es-ES"/>
           </a:p>
@@ -1883,7 +1884,7 @@
           <a:p>
             <a:fld id="{C403A486-0FA8-1249-B859-E247FA41F85C}" type="datetimeFigureOut">
               <a:rPr lang="es-ES" smtClean="0"/>
-              <a:t>8/23/13</a:t>
+              <a:t>10/17/14</a:t>
             </a:fld>
             <a:endParaRPr lang="es-ES"/>
           </a:p>
@@ -1978,7 +1979,7 @@
           <a:p>
             <a:fld id="{C403A486-0FA8-1249-B859-E247FA41F85C}" type="datetimeFigureOut">
               <a:rPr lang="es-ES" smtClean="0"/>
-              <a:t>8/23/13</a:t>
+              <a:t>10/17/14</a:t>
             </a:fld>
             <a:endParaRPr lang="es-ES"/>
           </a:p>
@@ -2255,7 +2256,7 @@
           <a:p>
             <a:fld id="{C403A486-0FA8-1249-B859-E247FA41F85C}" type="datetimeFigureOut">
               <a:rPr lang="es-ES" smtClean="0"/>
-              <a:t>8/23/13</a:t>
+              <a:t>10/17/14</a:t>
             </a:fld>
             <a:endParaRPr lang="es-ES"/>
           </a:p>
@@ -2508,7 +2509,7 @@
           <a:p>
             <a:fld id="{C403A486-0FA8-1249-B859-E247FA41F85C}" type="datetimeFigureOut">
               <a:rPr lang="es-ES" smtClean="0"/>
-              <a:t>8/23/13</a:t>
+              <a:t>10/17/14</a:t>
             </a:fld>
             <a:endParaRPr lang="es-ES"/>
           </a:p>
@@ -2721,7 +2722,7 @@
           <a:p>
             <a:fld id="{C403A486-0FA8-1249-B859-E247FA41F85C}" type="datetimeFigureOut">
               <a:rPr lang="es-ES" smtClean="0"/>
-              <a:t>8/23/13</a:t>
+              <a:t>10/17/14</a:t>
             </a:fld>
             <a:endParaRPr lang="es-ES"/>
           </a:p>
@@ -3113,11 +3114,7 @@
           <a:p>
             <a:r>
               <a:rPr lang="es-ES" dirty="0" smtClean="0"/>
-              <a:t>Ingenier</a:t>
-            </a:r>
-            <a:r>
-              <a:rPr lang="es-ES" dirty="0" smtClean="0"/>
-              <a:t>ía de Software I	</a:t>
+              <a:t>Ingeniería de Software I	</a:t>
             </a:r>
             <a:endParaRPr lang="es-ES" dirty="0"/>
           </a:p>
@@ -3224,25 +3221,13 @@
           <a:p>
             <a:r>
               <a:rPr lang="es-ES" dirty="0" smtClean="0"/>
-              <a:t>¿Qu</a:t>
-            </a:r>
+              <a:t>¿Qué es la IS y para que sirve?</a:t>
+            </a:r>
+          </a:p>
+          <a:p>
             <a:r>
               <a:rPr lang="es-ES" dirty="0" smtClean="0"/>
-              <a:t>é es la IS y para que sirve</a:t>
-            </a:r>
-            <a:r>
-              <a:rPr lang="es-ES" dirty="0" smtClean="0"/>
-              <a:t>?</a:t>
-            </a:r>
-          </a:p>
-          <a:p>
-            <a:r>
-              <a:rPr lang="es-ES" dirty="0" smtClean="0"/>
-              <a:t>Mencionar las características</a:t>
-            </a:r>
-            <a:r>
-              <a:rPr lang="es-ES" dirty="0" smtClean="0"/>
-              <a:t> de un buen software</a:t>
+              <a:t>Mencionar las características de un buen software</a:t>
             </a:r>
           </a:p>
           <a:p>
@@ -3254,11 +3239,7 @@
           <a:p>
             <a:r>
               <a:rPr lang="es-ES" dirty="0" smtClean="0"/>
-              <a:t>Mencione y describa por lo menos 5 mejores pr</a:t>
-            </a:r>
-            <a:r>
-              <a:rPr lang="es-ES" dirty="0" smtClean="0"/>
-              <a:t>ácticas que ayuden a mitigar mitos en la IS</a:t>
+              <a:t>Mencione y describa por lo menos 5 mejores prácticas que ayuden a mitigar mitos en la IS</a:t>
             </a:r>
           </a:p>
           <a:p>
@@ -3284,6 +3265,82 @@
     <p:extLst>
       <p:ext uri="{BB962C8B-B14F-4D97-AF65-F5344CB8AC3E}">
         <p14:creationId xmlns:p14="http://schemas.microsoft.com/office/powerpoint/2010/main" val="1572716029"/>
+      </p:ext>
+    </p:extLst>
+  </p:cSld>
+  <p:clrMapOvr>
+    <a:masterClrMapping/>
+  </p:clrMapOvr>
+</p:sld>
+</file>
+
+<file path=ppt/slides/slide3.xml><?xml version="1.0" encoding="utf-8"?>
+<p:sld xmlns:a="http://schemas.openxmlformats.org/drawingml/2006/main" xmlns:r="http://schemas.openxmlformats.org/officeDocument/2006/relationships" xmlns:p="http://schemas.openxmlformats.org/presentationml/2006/main">
+  <p:cSld>
+    <p:spTree>
+      <p:nvGrpSpPr>
+        <p:cNvPr id="1" name=""/>
+        <p:cNvGrpSpPr/>
+        <p:nvPr/>
+      </p:nvGrpSpPr>
+      <p:grpSpPr>
+        <a:xfrm>
+          <a:off x="0" y="0"/>
+          <a:ext cx="0" cy="0"/>
+          <a:chOff x="0" y="0"/>
+          <a:chExt cx="0" cy="0"/>
+        </a:xfrm>
+      </p:grpSpPr>
+      <p:sp>
+        <p:nvSpPr>
+          <p:cNvPr id="2" name="Título 1"/>
+          <p:cNvSpPr>
+            <a:spLocks noGrp="1"/>
+          </p:cNvSpPr>
+          <p:nvPr>
+            <p:ph type="title"/>
+          </p:nvPr>
+        </p:nvSpPr>
+        <p:spPr/>
+        <p:txBody>
+          <a:bodyPr/>
+          <a:lstStyle/>
+          <a:p>
+            <a:r>
+              <a:rPr lang="es-ES" dirty="0" smtClean="0"/>
+              <a:t>Otra diapositiva</a:t>
+            </a:r>
+            <a:endParaRPr lang="es-ES" dirty="0"/>
+          </a:p>
+        </p:txBody>
+      </p:sp>
+      <p:sp>
+        <p:nvSpPr>
+          <p:cNvPr id="3" name="Marcador de contenido 2"/>
+          <p:cNvSpPr>
+            <a:spLocks noGrp="1"/>
+          </p:cNvSpPr>
+          <p:nvPr>
+            <p:ph idx="1"/>
+          </p:nvPr>
+        </p:nvSpPr>
+        <p:spPr/>
+        <p:txBody>
+          <a:bodyPr/>
+          <a:lstStyle/>
+          <a:p>
+            <a:r>
+              <a:rPr lang="es-ES" dirty="0" smtClean="0"/>
+              <a:t>otra diapositiva</a:t>
+            </a:r>
+            <a:endParaRPr lang="es-ES" dirty="0"/>
+          </a:p>
+        </p:txBody>
+      </p:sp>
+    </p:spTree>
+    <p:extLst>
+      <p:ext uri="{BB962C8B-B14F-4D97-AF65-F5344CB8AC3E}">
+        <p14:creationId xmlns:p14="http://schemas.microsoft.com/office/powerpoint/2010/main" val="3335979999"/>
       </p:ext>
     </p:extLst>
   </p:cSld>

</xml_diff>